<commit_message>
Really final this time (maybe...probably not)
Tying up some loose ends with the syntax file and doing some cleaning.
</commit_message>
<xml_diff>
--- a/Presentation/Multiple Imputation in Stata Tutorial.pptx
+++ b/Presentation/Multiple Imputation in Stata Tutorial.pptx
@@ -8886,8 +8886,8 @@
         </p:blipFill>
         <p:spPr>
           <a:xfrm>
-            <a:off x="3342891" y="2027789"/>
-            <a:ext cx="5496692" cy="3467584"/>
+            <a:off x="3104129" y="1563994"/>
+            <a:ext cx="5973093" cy="3768121"/>
           </a:xfrm>
         </p:spPr>
       </p:pic>
@@ -8905,8 +8905,8 @@
         </p:nvGrpSpPr>
         <p:grpSpPr>
           <a:xfrm>
-            <a:off x="4366517" y="2816358"/>
-            <a:ext cx="4701238" cy="1952090"/>
+            <a:off x="4571190" y="2418392"/>
+            <a:ext cx="4701238" cy="2116477"/>
             <a:chOff x="1905000" y="1776046"/>
             <a:chExt cx="6751789" cy="3212123"/>
           </a:xfrm>

</xml_diff>

<commit_message>
Update Multiple Imputation in Stata Tutorial.pptx
</commit_message>
<xml_diff>
--- a/Presentation/Multiple Imputation in Stata Tutorial.pptx
+++ b/Presentation/Multiple Imputation in Stata Tutorial.pptx
@@ -8489,35 +8489,6 @@
           </a:p>
         </p:txBody>
       </p:sp>
-      <p:pic>
-        <p:nvPicPr>
-          <p:cNvPr id="5" name="Content Placeholder 4">
-            <a:extLst>
-              <a:ext uri="{FF2B5EF4-FFF2-40B4-BE49-F238E27FC236}">
-                <a16:creationId xmlns:a16="http://schemas.microsoft.com/office/drawing/2014/main" id="{4B029E2B-A733-C507-8D3A-A4ABE79083D2}"/>
-              </a:ext>
-            </a:extLst>
-          </p:cNvPr>
-          <p:cNvPicPr>
-            <a:picLocks noGrp="1" noChangeAspect="1"/>
-          </p:cNvPicPr>
-          <p:nvPr>
-            <p:ph idx="1"/>
-          </p:nvPr>
-        </p:nvPicPr>
-        <p:blipFill>
-          <a:blip r:embed="rId2"/>
-          <a:stretch>
-            <a:fillRect/>
-          </a:stretch>
-        </p:blipFill>
-        <p:spPr>
-          <a:xfrm>
-            <a:off x="2859640" y="955497"/>
-            <a:ext cx="6472720" cy="3945276"/>
-          </a:xfrm>
-        </p:spPr>
-      </p:pic>
       <p:sp>
         <p:nvSpPr>
           <p:cNvPr id="6" name="TextBox 5">
@@ -8793,7 +8764,7 @@
                 <a:latin typeface="Courier New" panose="02070309020205020404" pitchFamily="49" charset="0"/>
                 <a:cs typeface="Courier New" panose="02070309020205020404" pitchFamily="49" charset="0"/>
               </a:rPr>
-              <a:t>("Kernal Density")</a:t>
+              <a:t>("Kernel Density")</a:t>
             </a:r>
           </a:p>
           <a:p>
@@ -8804,6 +8775,35 @@
           </a:p>
         </p:txBody>
       </p:sp>
+      <p:pic>
+        <p:nvPicPr>
+          <p:cNvPr id="12" name="Content Placeholder 11">
+            <a:extLst>
+              <a:ext uri="{FF2B5EF4-FFF2-40B4-BE49-F238E27FC236}">
+                <a16:creationId xmlns:a16="http://schemas.microsoft.com/office/drawing/2014/main" id="{43A5A91A-4477-CAE4-0D8B-54D71DFE9573}"/>
+              </a:ext>
+            </a:extLst>
+          </p:cNvPr>
+          <p:cNvPicPr>
+            <a:picLocks noGrp="1" noChangeAspect="1"/>
+          </p:cNvPicPr>
+          <p:nvPr>
+            <p:ph idx="1"/>
+          </p:nvPr>
+        </p:nvPicPr>
+        <p:blipFill>
+          <a:blip r:embed="rId2"/>
+          <a:stretch>
+            <a:fillRect/>
+          </a:stretch>
+        </p:blipFill>
+        <p:spPr>
+          <a:xfrm>
+            <a:off x="2907586" y="955497"/>
+            <a:ext cx="6376827" cy="3925954"/>
+          </a:xfrm>
+        </p:spPr>
+      </p:pic>
     </p:spTree>
     <p:extLst>
       <p:ext uri="{BB962C8B-B14F-4D97-AF65-F5344CB8AC3E}">

</xml_diff>